<commit_message>
Implement wallet page and more visuals
</commit_message>
<xml_diff>
--- a/Documents/Finbank.pptx
+++ b/Documents/Finbank.pptx
@@ -19,8 +19,20 @@
   <p:notesSz cx="6858000" cy="9144000"/>
   <p:embeddedFontLst>
     <p:embeddedFont>
-      <p:font typeface="Roboto Slab Medium" pitchFamily="2" charset="0"/>
+      <p:font typeface="Raleway" pitchFamily="2" charset="77"/>
       <p:regular r:id="rId9"/>
+      <p:bold r:id="rId10"/>
+      <p:italic r:id="rId11"/>
+      <p:boldItalic r:id="rId12"/>
+    </p:embeddedFont>
+    <p:embeddedFont>
+      <p:font typeface="Roboto Slab Medium" panose="020F0502020204030204" pitchFamily="34" charset="0"/>
+      <p:regular r:id="rId13"/>
+    </p:embeddedFont>
+    <p:embeddedFont>
+      <p:font typeface="Work Sans" pitchFamily="2" charset="77"/>
+      <p:regular r:id="rId14"/>
+      <p:bold r:id="rId15"/>
     </p:embeddedFont>
   </p:embeddedFontLst>
   <p:defaultTextStyle>
@@ -9057,8 +9069,8 @@
         </p:nvSpPr>
         <p:spPr>
           <a:xfrm>
-            <a:off x="169131" y="3053964"/>
-            <a:ext cx="3493402" cy="475800"/>
+            <a:off x="327919" y="3131021"/>
+            <a:ext cx="2798562" cy="1090549"/>
           </a:xfrm>
           <a:prstGeom prst="rect">
             <a:avLst/>
@@ -9072,7 +9084,7 @@
           <a:p>
             <a:pPr algn="ctr"/>
             <a:r>
-              <a:rPr lang="en-US" err="1">
+              <a:rPr lang="en-US" dirty="0" err="1">
                 <a:latin typeface="Roboto Slab Medium"/>
                 <a:ea typeface="Roboto Slab Medium"/>
               </a:rPr>
@@ -9086,7 +9098,7 @@
               <a:t> </a:t>
             </a:r>
             <a:r>
-              <a:rPr lang="en-US" err="1">
+              <a:rPr lang="en-US" dirty="0" err="1">
                 <a:latin typeface="Roboto Slab Medium"/>
                 <a:ea typeface="Roboto Slab Medium"/>
               </a:rPr>
@@ -9100,7 +9112,7 @@
               <a:t> </a:t>
             </a:r>
             <a:r>
-              <a:rPr lang="en-US" err="1">
+              <a:rPr lang="en-US" dirty="0" err="1">
                 <a:latin typeface="Roboto Slab Medium"/>
                 <a:ea typeface="Roboto Slab Medium"/>
               </a:rPr>
@@ -9114,7 +9126,7 @@
               <a:t> </a:t>
             </a:r>
             <a:r>
-              <a:rPr lang="en-US" err="1">
+              <a:rPr lang="en-US" dirty="0" err="1">
                 <a:latin typeface="Roboto Slab Medium"/>
                 <a:ea typeface="Roboto Slab Medium"/>
               </a:rPr>
@@ -9125,10 +9137,24 @@
                 <a:latin typeface="Roboto Slab Medium"/>
                 <a:ea typeface="Roboto Slab Medium"/>
               </a:rPr>
-              <a:t> с </a:t>
+              <a:t>, </a:t>
             </a:r>
             <a:r>
-              <a:rPr lang="en-US" err="1">
+              <a:rPr lang="en-US" dirty="0" err="1">
+                <a:latin typeface="Roboto Slab Medium"/>
+                <a:ea typeface="Roboto Slab Medium"/>
+              </a:rPr>
+              <a:t>с</a:t>
+            </a:r>
+            <a:r>
+              <a:rPr lang="en-US" dirty="0">
+                <a:latin typeface="Roboto Slab Medium"/>
+                <a:ea typeface="Roboto Slab Medium"/>
+              </a:rPr>
+              <a:t> </a:t>
+            </a:r>
+            <a:r>
+              <a:rPr lang="en-US" dirty="0" err="1">
                 <a:latin typeface="Roboto Slab Medium"/>
                 <a:ea typeface="Roboto Slab Medium"/>
               </a:rPr>
@@ -9142,7 +9168,7 @@
               <a:t> </a:t>
             </a:r>
             <a:r>
-              <a:rPr lang="en-US" err="1">
+              <a:rPr lang="en-US" dirty="0" err="1">
                 <a:latin typeface="Roboto Slab Medium"/>
                 <a:ea typeface="Roboto Slab Medium"/>
               </a:rPr>
@@ -9156,13 +9182,27 @@
               <a:t> </a:t>
             </a:r>
             <a:r>
-              <a:rPr lang="en-US" err="1">
+              <a:rPr lang="en-US" dirty="0" err="1">
                 <a:latin typeface="Roboto Slab Medium"/>
                 <a:ea typeface="Roboto Slab Medium"/>
               </a:rPr>
               <a:t>инвестиране</a:t>
             </a:r>
-            <a:endParaRPr lang="en-US" err="1"/>
+            <a:r>
+              <a:rPr lang="bg-BG" dirty="0">
+                <a:latin typeface="Roboto Slab Medium"/>
+                <a:ea typeface="Roboto Slab Medium"/>
+              </a:rPr>
+              <a:t> и лични финанси</a:t>
+            </a:r>
+            <a:r>
+              <a:rPr lang="en-US" dirty="0">
+                <a:latin typeface="Roboto Slab Medium"/>
+                <a:ea typeface="Roboto Slab Medium"/>
+              </a:rPr>
+              <a:t> </a:t>
+            </a:r>
+            <a:endParaRPr lang="en-US" dirty="0"/>
           </a:p>
         </p:txBody>
       </p:sp>

</xml_diff>

<commit_message>
Revert "Merge branch 'Deploy-project-on-all-platforms' of https://github.com/BKKyovtorov21/Finbank into Deploy-project-on-all-platforms"
This reverts commit cac20ae9eee0d6fd063350c57abed69cdf7a83e7, reversing
changes made to e256bab10121072cd957e9f3af821dd3fe2ab45e.
</commit_message>
<xml_diff>
--- a/Documents/Finbank.pptx
+++ b/Documents/Finbank.pptx
@@ -19,20 +19,8 @@
   <p:notesSz cx="6858000" cy="9144000"/>
   <p:embeddedFontLst>
     <p:embeddedFont>
-      <p:font typeface="Raleway" pitchFamily="2" charset="77"/>
+      <p:font typeface="Roboto Slab Medium" pitchFamily="2" charset="0"/>
       <p:regular r:id="rId9"/>
-      <p:bold r:id="rId10"/>
-      <p:italic r:id="rId11"/>
-      <p:boldItalic r:id="rId12"/>
-    </p:embeddedFont>
-    <p:embeddedFont>
-      <p:font typeface="Roboto Slab Medium" panose="020F0502020204030204" pitchFamily="34" charset="0"/>
-      <p:regular r:id="rId13"/>
-    </p:embeddedFont>
-    <p:embeddedFont>
-      <p:font typeface="Work Sans" pitchFamily="2" charset="77"/>
-      <p:regular r:id="rId14"/>
-      <p:bold r:id="rId15"/>
     </p:embeddedFont>
   </p:embeddedFontLst>
   <p:defaultTextStyle>
@@ -9069,8 +9057,8 @@
         </p:nvSpPr>
         <p:spPr>
           <a:xfrm>
-            <a:off x="327919" y="3131021"/>
-            <a:ext cx="2798562" cy="1090549"/>
+            <a:off x="169131" y="3053964"/>
+            <a:ext cx="3493402" cy="475800"/>
           </a:xfrm>
           <a:prstGeom prst="rect">
             <a:avLst/>
@@ -9084,7 +9072,7 @@
           <a:p>
             <a:pPr algn="ctr"/>
             <a:r>
-              <a:rPr lang="en-US" dirty="0" err="1">
+              <a:rPr lang="en-US" err="1">
                 <a:latin typeface="Roboto Slab Medium"/>
                 <a:ea typeface="Roboto Slab Medium"/>
               </a:rPr>
@@ -9098,7 +9086,7 @@
               <a:t> </a:t>
             </a:r>
             <a:r>
-              <a:rPr lang="en-US" dirty="0" err="1">
+              <a:rPr lang="en-US" err="1">
                 <a:latin typeface="Roboto Slab Medium"/>
                 <a:ea typeface="Roboto Slab Medium"/>
               </a:rPr>
@@ -9112,7 +9100,7 @@
               <a:t> </a:t>
             </a:r>
             <a:r>
-              <a:rPr lang="en-US" dirty="0" err="1">
+              <a:rPr lang="en-US" err="1">
                 <a:latin typeface="Roboto Slab Medium"/>
                 <a:ea typeface="Roboto Slab Medium"/>
               </a:rPr>
@@ -9126,7 +9114,7 @@
               <a:t> </a:t>
             </a:r>
             <a:r>
-              <a:rPr lang="en-US" dirty="0" err="1">
+              <a:rPr lang="en-US" err="1">
                 <a:latin typeface="Roboto Slab Medium"/>
                 <a:ea typeface="Roboto Slab Medium"/>
               </a:rPr>
@@ -9137,24 +9125,10 @@
                 <a:latin typeface="Roboto Slab Medium"/>
                 <a:ea typeface="Roboto Slab Medium"/>
               </a:rPr>
-              <a:t>, </a:t>
+              <a:t> с </a:t>
             </a:r>
             <a:r>
-              <a:rPr lang="en-US" dirty="0" err="1">
-                <a:latin typeface="Roboto Slab Medium"/>
-                <a:ea typeface="Roboto Slab Medium"/>
-              </a:rPr>
-              <a:t>с</a:t>
-            </a:r>
-            <a:r>
-              <a:rPr lang="en-US" dirty="0">
-                <a:latin typeface="Roboto Slab Medium"/>
-                <a:ea typeface="Roboto Slab Medium"/>
-              </a:rPr>
-              <a:t> </a:t>
-            </a:r>
-            <a:r>
-              <a:rPr lang="en-US" dirty="0" err="1">
+              <a:rPr lang="en-US" err="1">
                 <a:latin typeface="Roboto Slab Medium"/>
                 <a:ea typeface="Roboto Slab Medium"/>
               </a:rPr>
@@ -9168,7 +9142,7 @@
               <a:t> </a:t>
             </a:r>
             <a:r>
-              <a:rPr lang="en-US" dirty="0" err="1">
+              <a:rPr lang="en-US" err="1">
                 <a:latin typeface="Roboto Slab Medium"/>
                 <a:ea typeface="Roboto Slab Medium"/>
               </a:rPr>
@@ -9182,27 +9156,13 @@
               <a:t> </a:t>
             </a:r>
             <a:r>
-              <a:rPr lang="en-US" dirty="0" err="1">
+              <a:rPr lang="en-US" err="1">
                 <a:latin typeface="Roboto Slab Medium"/>
                 <a:ea typeface="Roboto Slab Medium"/>
               </a:rPr>
               <a:t>инвестиране</a:t>
             </a:r>
-            <a:r>
-              <a:rPr lang="bg-BG" dirty="0">
-                <a:latin typeface="Roboto Slab Medium"/>
-                <a:ea typeface="Roboto Slab Medium"/>
-              </a:rPr>
-              <a:t> и лични финанси</a:t>
-            </a:r>
-            <a:r>
-              <a:rPr lang="en-US" dirty="0">
-                <a:latin typeface="Roboto Slab Medium"/>
-                <a:ea typeface="Roboto Slab Medium"/>
-              </a:rPr>
-              <a:t> </a:t>
-            </a:r>
-            <a:endParaRPr lang="en-US" dirty="0"/>
+            <a:endParaRPr lang="en-US" err="1"/>
           </a:p>
         </p:txBody>
       </p:sp>

</xml_diff>

<commit_message>
Revert to "Implement wallet page and more visuals"
</commit_message>
<xml_diff>
--- a/Documents/Finbank.pptx
+++ b/Documents/Finbank.pptx
@@ -19,8 +19,20 @@
   <p:notesSz cx="6858000" cy="9144000"/>
   <p:embeddedFontLst>
     <p:embeddedFont>
-      <p:font typeface="Roboto Slab Medium" pitchFamily="2" charset="0"/>
+      <p:font typeface="Raleway" pitchFamily="2" charset="77"/>
       <p:regular r:id="rId9"/>
+      <p:bold r:id="rId10"/>
+      <p:italic r:id="rId11"/>
+      <p:boldItalic r:id="rId12"/>
+    </p:embeddedFont>
+    <p:embeddedFont>
+      <p:font typeface="Roboto Slab Medium" panose="020F0502020204030204" pitchFamily="34" charset="0"/>
+      <p:regular r:id="rId13"/>
+    </p:embeddedFont>
+    <p:embeddedFont>
+      <p:font typeface="Work Sans" pitchFamily="2" charset="77"/>
+      <p:regular r:id="rId14"/>
+      <p:bold r:id="rId15"/>
     </p:embeddedFont>
   </p:embeddedFontLst>
   <p:defaultTextStyle>
@@ -9057,8 +9069,8 @@
         </p:nvSpPr>
         <p:spPr>
           <a:xfrm>
-            <a:off x="169131" y="3053964"/>
-            <a:ext cx="3493402" cy="475800"/>
+            <a:off x="327919" y="3131021"/>
+            <a:ext cx="2798562" cy="1090549"/>
           </a:xfrm>
           <a:prstGeom prst="rect">
             <a:avLst/>
@@ -9072,7 +9084,7 @@
           <a:p>
             <a:pPr algn="ctr"/>
             <a:r>
-              <a:rPr lang="en-US" err="1">
+              <a:rPr lang="en-US" dirty="0" err="1">
                 <a:latin typeface="Roboto Slab Medium"/>
                 <a:ea typeface="Roboto Slab Medium"/>
               </a:rPr>
@@ -9086,7 +9098,7 @@
               <a:t> </a:t>
             </a:r>
             <a:r>
-              <a:rPr lang="en-US" err="1">
+              <a:rPr lang="en-US" dirty="0" err="1">
                 <a:latin typeface="Roboto Slab Medium"/>
                 <a:ea typeface="Roboto Slab Medium"/>
               </a:rPr>
@@ -9100,7 +9112,7 @@
               <a:t> </a:t>
             </a:r>
             <a:r>
-              <a:rPr lang="en-US" err="1">
+              <a:rPr lang="en-US" dirty="0" err="1">
                 <a:latin typeface="Roboto Slab Medium"/>
                 <a:ea typeface="Roboto Slab Medium"/>
               </a:rPr>
@@ -9114,7 +9126,7 @@
               <a:t> </a:t>
             </a:r>
             <a:r>
-              <a:rPr lang="en-US" err="1">
+              <a:rPr lang="en-US" dirty="0" err="1">
                 <a:latin typeface="Roboto Slab Medium"/>
                 <a:ea typeface="Roboto Slab Medium"/>
               </a:rPr>
@@ -9125,10 +9137,24 @@
                 <a:latin typeface="Roboto Slab Medium"/>
                 <a:ea typeface="Roboto Slab Medium"/>
               </a:rPr>
-              <a:t> с </a:t>
+              <a:t>, </a:t>
             </a:r>
             <a:r>
-              <a:rPr lang="en-US" err="1">
+              <a:rPr lang="en-US" dirty="0" err="1">
+                <a:latin typeface="Roboto Slab Medium"/>
+                <a:ea typeface="Roboto Slab Medium"/>
+              </a:rPr>
+              <a:t>с</a:t>
+            </a:r>
+            <a:r>
+              <a:rPr lang="en-US" dirty="0">
+                <a:latin typeface="Roboto Slab Medium"/>
+                <a:ea typeface="Roboto Slab Medium"/>
+              </a:rPr>
+              <a:t> </a:t>
+            </a:r>
+            <a:r>
+              <a:rPr lang="en-US" dirty="0" err="1">
                 <a:latin typeface="Roboto Slab Medium"/>
                 <a:ea typeface="Roboto Slab Medium"/>
               </a:rPr>
@@ -9142,7 +9168,7 @@
               <a:t> </a:t>
             </a:r>
             <a:r>
-              <a:rPr lang="en-US" err="1">
+              <a:rPr lang="en-US" dirty="0" err="1">
                 <a:latin typeface="Roboto Slab Medium"/>
                 <a:ea typeface="Roboto Slab Medium"/>
               </a:rPr>
@@ -9156,13 +9182,27 @@
               <a:t> </a:t>
             </a:r>
             <a:r>
-              <a:rPr lang="en-US" err="1">
+              <a:rPr lang="en-US" dirty="0" err="1">
                 <a:latin typeface="Roboto Slab Medium"/>
                 <a:ea typeface="Roboto Slab Medium"/>
               </a:rPr>
               <a:t>инвестиране</a:t>
             </a:r>
-            <a:endParaRPr lang="en-US" err="1"/>
+            <a:r>
+              <a:rPr lang="bg-BG" dirty="0">
+                <a:latin typeface="Roboto Slab Medium"/>
+                <a:ea typeface="Roboto Slab Medium"/>
+              </a:rPr>
+              <a:t> и лични финанси</a:t>
+            </a:r>
+            <a:r>
+              <a:rPr lang="en-US" dirty="0">
+                <a:latin typeface="Roboto Slab Medium"/>
+                <a:ea typeface="Roboto Slab Medium"/>
+              </a:rPr>
+              <a:t> </a:t>
+            </a:r>
+            <a:endParaRPr lang="en-US" dirty="0"/>
           </a:p>
         </p:txBody>
       </p:sp>

</xml_diff>